<commit_message>
docs: actualizar cambios presentacion
</commit_message>
<xml_diff>
--- a/4.Presentación/DIAPOSITIVAS_PROYECTO - GAES 7.pptx
+++ b/4.Presentación/DIAPOSITIVAS_PROYECTO - GAES 7.pptx
@@ -1,6 +1,6 @@
 
 <file path=ppt/presentation.xml><?xml version="1.0" encoding="utf-8"?>
-<p:presentation xmlns:a="http://schemas.openxmlformats.org/drawingml/2006/main" xmlns:r="http://schemas.openxmlformats.org/officeDocument/2006/relationships" xmlns:mc="http://schemas.openxmlformats.org/markup-compatibility/2006" xmlns:mv="urn:schemas-microsoft-com:mac:vml" xmlns:p="http://schemas.openxmlformats.org/presentationml/2006/main" xmlns:c="http://schemas.openxmlformats.org/drawingml/2006/chart" xmlns:dgm="http://schemas.openxmlformats.org/drawingml/2006/diagram" xmlns:o="urn:schemas-microsoft-com:office:office" xmlns:v="urn:schemas-microsoft-com:vml" xmlns:pvml="urn:schemas-microsoft-com:office:powerpoint" xmlns:com="http://schemas.openxmlformats.org/drawingml/2006/compatibility" xmlns:p14="http://schemas.microsoft.com/office/powerpoint/2010/main" xmlns:p15="http://schemas.microsoft.com/office/powerpoint/2012/main" xmlns:ahyp="http://schemas.microsoft.com/office/drawing/2018/hyperlinkcolor" autoCompressPictures="0" embedTrueTypeFonts="1" strictFirstAndLastChars="0" saveSubsetFonts="1">
+<p:presentation xmlns:a="http://schemas.openxmlformats.org/drawingml/2006/main" xmlns:r="http://schemas.openxmlformats.org/officeDocument/2006/relationships" xmlns:mc="http://schemas.openxmlformats.org/markup-compatibility/2006" xmlns:mv="urn:schemas-microsoft-com:mac:vml" xmlns:p="http://schemas.openxmlformats.org/presentationml/2006/main" xmlns:c="http://schemas.openxmlformats.org/drawingml/2006/chart" xmlns:dgm="http://schemas.openxmlformats.org/drawingml/2006/diagram" xmlns:o="urn:schemas-microsoft-com:office:office" xmlns:v="urn:schemas-microsoft-com:vml" xmlns:pvml="urn:schemas-microsoft-com:office:powerpoint" xmlns:com="http://schemas.openxmlformats.org/drawingml/2006/compatibility" xmlns:p14="http://schemas.microsoft.com/office/powerpoint/2010/main" xmlns:p15="http://schemas.microsoft.com/office/powerpoint/2012/main" xmlns:ahyp="http://schemas.microsoft.com/office/drawing/2018/hyperlinkcolor" autoCompressPictures="0" strictFirstAndLastChars="0" saveSubsetFonts="1">
   <p:sldMasterIdLst>
     <p:sldMasterId id="2147483662" r:id="rId3"/>
   </p:sldMasterIdLst>
@@ -32,22 +32,6 @@
   </p:sldIdLst>
   <p:sldSz cy="6858000" cx="12192000"/>
   <p:notesSz cx="6858000" cy="9144000"/>
-  <p:embeddedFontLst>
-    <p:embeddedFont>
-      <p:font typeface="Work Sans"/>
-      <p:regular r:id="rId26"/>
-      <p:bold r:id="rId27"/>
-      <p:italic r:id="rId28"/>
-      <p:boldItalic r:id="rId29"/>
-    </p:embeddedFont>
-    <p:embeddedFont>
-      <p:font typeface="Work Sans Light"/>
-      <p:regular r:id="rId30"/>
-      <p:bold r:id="rId31"/>
-      <p:italic r:id="rId32"/>
-      <p:boldItalic r:id="rId33"/>
-    </p:embeddedFont>
-  </p:embeddedFontLst>
   <p:defaultTextStyle>
     <a:defPPr lvl="0" marR="0" rtl="0" algn="l">
       <a:lnSpc>
@@ -21205,7 +21189,7 @@
         <p:spPr>
           <a:xfrm>
             <a:off x="709450" y="1936350"/>
-            <a:ext cx="10819200" cy="2339700"/>
+            <a:ext cx="10819200" cy="3879000"/>
           </a:xfrm>
           <a:prstGeom prst="rect">
             <a:avLst/>
@@ -21236,7 +21220,7 @@
                   <a:schemeClr val="dk1"/>
                 </a:solidFill>
               </a:rPr>
-              <a:t>Diseñar e implementar un sistema digital de gestión de inventario</a:t>
+              <a:t>Diseñar e implementar un sistema de información para la gestión de inventario</a:t>
             </a:r>
             <a:r>
               <a:rPr lang="es-CO" sz="2000">
@@ -21244,7 +21228,23 @@
                   <a:schemeClr val="dk1"/>
                 </a:solidFill>
               </a:rPr>
-              <a:t> que permita registrar, controlar y monitorear en tiempo real las entradas y salidas de productos e insumos, con alertas de abastecimiento.</a:t>
+              <a:t> que permita registrar, controlar y monitorear en tiempo real las entradas y salidas de productos e insumos (materia </a:t>
+            </a:r>
+            <a:r>
+              <a:rPr lang="es-CO" sz="2000">
+                <a:solidFill>
+                  <a:schemeClr val="dk1"/>
+                </a:solidFill>
+              </a:rPr>
+              <a:t>prima)</a:t>
+            </a:r>
+            <a:r>
+              <a:rPr lang="es-CO" sz="2000">
+                <a:solidFill>
+                  <a:schemeClr val="dk1"/>
+                </a:solidFill>
+              </a:rPr>
+              <a:t>, con alertas de abastecimiento.</a:t>
             </a:r>
             <a:endParaRPr sz="2000">
               <a:solidFill>
@@ -21314,30 +21314,157 @@
               <a:buNone/>
             </a:pPr>
             <a:r>
-              <a:rPr lang="es-CO" sz="2000">
+              <a:t/>
+            </a:r>
+            <a:endParaRPr sz="2000">
+              <a:solidFill>
+                <a:schemeClr val="dk1"/>
+              </a:solidFill>
+            </a:endParaRPr>
+          </a:p>
+          <a:p>
+            <a:pPr indent="-355600" lvl="0" marL="457200" rtl="0" algn="l">
+              <a:spcBef>
+                <a:spcPts val="0"/>
+              </a:spcBef>
+              <a:spcAft>
+                <a:spcPts val="0"/>
+              </a:spcAft>
+              <a:buClr>
+                <a:schemeClr val="dk1"/>
+              </a:buClr>
+              <a:buSzPts val="2000"/>
+              <a:buAutoNum type="arabicPeriod"/>
+            </a:pPr>
+            <a:r>
+              <a:rPr b="1" lang="es-CO" sz="2000">
                 <a:solidFill>
                   <a:schemeClr val="dk1"/>
                 </a:solidFill>
               </a:rPr>
-              <a:t>Especificar </a:t>
+              <a:t>Modulo Factura Compra.</a:t>
+            </a:r>
+            <a:endParaRPr b="1" sz="2000">
+              <a:solidFill>
+                <a:schemeClr val="dk1"/>
+              </a:solidFill>
+            </a:endParaRPr>
+          </a:p>
+          <a:p>
+            <a:pPr indent="-355600" lvl="0" marL="457200" rtl="0" algn="l">
+              <a:spcBef>
+                <a:spcPts val="0"/>
+              </a:spcBef>
+              <a:spcAft>
+                <a:spcPts val="0"/>
+              </a:spcAft>
+              <a:buClr>
+                <a:schemeClr val="dk1"/>
+              </a:buClr>
+              <a:buSzPts val="2000"/>
+              <a:buAutoNum type="arabicPeriod"/>
+            </a:pPr>
+            <a:r>
+              <a:rPr b="1" lang="es-CO" sz="2000">
+                <a:solidFill>
+                  <a:schemeClr val="dk1"/>
+                </a:solidFill>
+              </a:rPr>
+              <a:t>M</a:t>
             </a:r>
             <a:r>
-              <a:rPr lang="es-CO" sz="2000">
+              <a:rPr b="1" lang="es-CO" sz="2000">
                 <a:solidFill>
                   <a:schemeClr val="dk1"/>
                 </a:solidFill>
               </a:rPr>
-              <a:t>módulos</a:t>
+              <a:t>ódulo Factura Venta.</a:t>
             </a:r>
+            <a:endParaRPr b="1" sz="2000">
+              <a:solidFill>
+                <a:schemeClr val="dk1"/>
+              </a:solidFill>
+            </a:endParaRPr>
+          </a:p>
+          <a:p>
+            <a:pPr indent="-355600" lvl="0" marL="457200" rtl="0" algn="l">
+              <a:spcBef>
+                <a:spcPts val="0"/>
+              </a:spcBef>
+              <a:spcAft>
+                <a:spcPts val="0"/>
+              </a:spcAft>
+              <a:buClr>
+                <a:schemeClr val="dk1"/>
+              </a:buClr>
+              <a:buSzPts val="2000"/>
+              <a:buAutoNum type="arabicPeriod"/>
+            </a:pPr>
             <a:r>
-              <a:rPr lang="es-CO" sz="2000">
+              <a:rPr b="1" lang="es-CO" sz="2000">
                 <a:solidFill>
                   <a:schemeClr val="dk1"/>
                 </a:solidFill>
               </a:rPr>
-              <a:t> o gestiones (DCU)</a:t>
+              <a:t>Módulo Producto.</a:t>
             </a:r>
-            <a:endParaRPr sz="2000">
+            <a:endParaRPr b="1" sz="2000">
+              <a:solidFill>
+                <a:schemeClr val="dk1"/>
+              </a:solidFill>
+            </a:endParaRPr>
+          </a:p>
+          <a:p>
+            <a:pPr indent="-355600" lvl="0" marL="457200" rtl="0" algn="l">
+              <a:spcBef>
+                <a:spcPts val="0"/>
+              </a:spcBef>
+              <a:spcAft>
+                <a:spcPts val="0"/>
+              </a:spcAft>
+              <a:buClr>
+                <a:schemeClr val="dk1"/>
+              </a:buClr>
+              <a:buSzPts val="2000"/>
+              <a:buAutoNum type="arabicPeriod"/>
+            </a:pPr>
+            <a:r>
+              <a:rPr b="1" lang="es-CO" sz="2000">
+                <a:solidFill>
+                  <a:schemeClr val="dk1"/>
+                </a:solidFill>
+              </a:rPr>
+              <a:t>Módulo Materia Prima.</a:t>
+            </a:r>
+            <a:endParaRPr b="1" sz="2000">
+              <a:solidFill>
+                <a:schemeClr val="dk1"/>
+              </a:solidFill>
+            </a:endParaRPr>
+          </a:p>
+          <a:p>
+            <a:pPr indent="-355600" lvl="0" marL="457200" rtl="0" algn="l">
+              <a:spcBef>
+                <a:spcPts val="0"/>
+              </a:spcBef>
+              <a:spcAft>
+                <a:spcPts val="0"/>
+              </a:spcAft>
+              <a:buClr>
+                <a:schemeClr val="dk1"/>
+              </a:buClr>
+              <a:buSzPts val="2000"/>
+              <a:buAutoNum type="arabicPeriod"/>
+            </a:pPr>
+            <a:r>
+              <a:rPr b="1" lang="es-CO" sz="2000">
+                <a:solidFill>
+                  <a:schemeClr val="dk1"/>
+                </a:solidFill>
+              </a:rPr>
+              <a:t>Módulo Producción Materia Prima.</a:t>
+            </a:r>
+            <a:endParaRPr b="1" sz="2000">
               <a:solidFill>
                 <a:schemeClr val="dk1"/>
               </a:solidFill>

</xml_diff>